<commit_message>
Updated Tim's talks to remove extraneous slides
</commit_message>
<xml_diff>
--- a/16_dolch_science_ipta2012.pptx
+++ b/16_dolch_science_ipta2012.pptx
@@ -20,12 +20,6 @@
     <p:sldId id="275" r:id="rId14"/>
     <p:sldId id="276" r:id="rId15"/>
     <p:sldId id="264" r:id="rId16"/>
-    <p:sldId id="260" r:id="rId17"/>
-    <p:sldId id="269" r:id="rId18"/>
-    <p:sldId id="267" r:id="rId19"/>
-    <p:sldId id="271" r:id="rId20"/>
-    <p:sldId id="273" r:id="rId21"/>
-    <p:sldId id="274" r:id="rId22"/>
   </p:sldIdLst>
   <p:sldSz cx="9144000" cy="6858000" type="screen4x3"/>
   <p:notesSz cx="6858000" cy="9144000"/>
@@ -144,12 +138,6 @@
             <p14:sldId id="275"/>
             <p14:sldId id="276"/>
             <p14:sldId id="264"/>
-            <p14:sldId id="260"/>
-            <p14:sldId id="269"/>
-            <p14:sldId id="267"/>
-            <p14:sldId id="271"/>
-            <p14:sldId id="273"/>
-            <p14:sldId id="274"/>
           </p14:sldIdLst>
         </p14:section>
       </p14:sectionLst>
@@ -339,7 +327,7 @@
           <a:p>
             <a:fld id="{6B925EC7-B3F5-D44B-9969-40AC035965F1}" type="datetimeFigureOut">
               <a:rPr lang="en-US" smtClean="0"/>
-              <a:t>6/25/12</a:t>
+              <a:t>8/29/12</a:t>
             </a:fld>
             <a:endParaRPr lang="en-US"/>
           </a:p>
@@ -509,7 +497,7 @@
           <a:p>
             <a:fld id="{6B925EC7-B3F5-D44B-9969-40AC035965F1}" type="datetimeFigureOut">
               <a:rPr lang="en-US" smtClean="0"/>
-              <a:t>6/25/12</a:t>
+              <a:t>8/29/12</a:t>
             </a:fld>
             <a:endParaRPr lang="en-US"/>
           </a:p>
@@ -689,7 +677,7 @@
           <a:p>
             <a:fld id="{6B925EC7-B3F5-D44B-9969-40AC035965F1}" type="datetimeFigureOut">
               <a:rPr lang="en-US" smtClean="0"/>
-              <a:t>6/25/12</a:t>
+              <a:t>8/29/12</a:t>
             </a:fld>
             <a:endParaRPr lang="en-US"/>
           </a:p>
@@ -859,7 +847,7 @@
           <a:p>
             <a:fld id="{6B925EC7-B3F5-D44B-9969-40AC035965F1}" type="datetimeFigureOut">
               <a:rPr lang="en-US" smtClean="0"/>
-              <a:t>6/25/12</a:t>
+              <a:t>8/29/12</a:t>
             </a:fld>
             <a:endParaRPr lang="en-US"/>
           </a:p>
@@ -1105,7 +1093,7 @@
           <a:p>
             <a:fld id="{6B925EC7-B3F5-D44B-9969-40AC035965F1}" type="datetimeFigureOut">
               <a:rPr lang="en-US" smtClean="0"/>
-              <a:t>6/25/12</a:t>
+              <a:t>8/29/12</a:t>
             </a:fld>
             <a:endParaRPr lang="en-US"/>
           </a:p>
@@ -1393,7 +1381,7 @@
           <a:p>
             <a:fld id="{6B925EC7-B3F5-D44B-9969-40AC035965F1}" type="datetimeFigureOut">
               <a:rPr lang="en-US" smtClean="0"/>
-              <a:t>6/25/12</a:t>
+              <a:t>8/29/12</a:t>
             </a:fld>
             <a:endParaRPr lang="en-US"/>
           </a:p>
@@ -1815,7 +1803,7 @@
           <a:p>
             <a:fld id="{6B925EC7-B3F5-D44B-9969-40AC035965F1}" type="datetimeFigureOut">
               <a:rPr lang="en-US" smtClean="0"/>
-              <a:t>6/25/12</a:t>
+              <a:t>8/29/12</a:t>
             </a:fld>
             <a:endParaRPr lang="en-US"/>
           </a:p>
@@ -1933,7 +1921,7 @@
           <a:p>
             <a:fld id="{6B925EC7-B3F5-D44B-9969-40AC035965F1}" type="datetimeFigureOut">
               <a:rPr lang="en-US" smtClean="0"/>
-              <a:t>6/25/12</a:t>
+              <a:t>8/29/12</a:t>
             </a:fld>
             <a:endParaRPr lang="en-US"/>
           </a:p>
@@ -2028,7 +2016,7 @@
           <a:p>
             <a:fld id="{6B925EC7-B3F5-D44B-9969-40AC035965F1}" type="datetimeFigureOut">
               <a:rPr lang="en-US" smtClean="0"/>
-              <a:t>6/25/12</a:t>
+              <a:t>8/29/12</a:t>
             </a:fld>
             <a:endParaRPr lang="en-US"/>
           </a:p>
@@ -2305,7 +2293,7 @@
           <a:p>
             <a:fld id="{6B925EC7-B3F5-D44B-9969-40AC035965F1}" type="datetimeFigureOut">
               <a:rPr lang="en-US" smtClean="0"/>
-              <a:t>6/25/12</a:t>
+              <a:t>8/29/12</a:t>
             </a:fld>
             <a:endParaRPr lang="en-US"/>
           </a:p>
@@ -2558,7 +2546,7 @@
           <a:p>
             <a:fld id="{6B925EC7-B3F5-D44B-9969-40AC035965F1}" type="datetimeFigureOut">
               <a:rPr lang="en-US" smtClean="0"/>
-              <a:t>6/25/12</a:t>
+              <a:t>8/29/12</a:t>
             </a:fld>
             <a:endParaRPr lang="en-US"/>
           </a:p>
@@ -2771,7 +2759,7 @@
           <a:p>
             <a:fld id="{6B925EC7-B3F5-D44B-9969-40AC035965F1}" type="datetimeFigureOut">
               <a:rPr lang="en-US" smtClean="0"/>
-              <a:t>6/25/12</a:t>
+              <a:t>8/29/12</a:t>
             </a:fld>
             <a:endParaRPr lang="en-US"/>
           </a:p>
@@ -4191,696 +4179,6 @@
 </p:sld>
 </file>
 
-<file path=ppt/slides/slide16.xml><?xml version="1.0" encoding="utf-8"?>
-<p:sld xmlns:a="http://schemas.openxmlformats.org/drawingml/2006/main" xmlns:r="http://schemas.openxmlformats.org/officeDocument/2006/relationships" xmlns:p="http://schemas.openxmlformats.org/presentationml/2006/main">
-  <p:cSld>
-    <p:spTree>
-      <p:nvGrpSpPr>
-        <p:cNvPr id="1" name=""/>
-        <p:cNvGrpSpPr/>
-        <p:nvPr/>
-      </p:nvGrpSpPr>
-      <p:grpSpPr>
-        <a:xfrm>
-          <a:off x="0" y="0"/>
-          <a:ext cx="0" cy="0"/>
-          <a:chOff x="0" y="0"/>
-          <a:chExt cx="0" cy="0"/>
-        </a:xfrm>
-      </p:grpSpPr>
-      <p:sp>
-        <p:nvSpPr>
-          <p:cNvPr id="2" name="Title 1"/>
-          <p:cNvSpPr>
-            <a:spLocks noGrp="1"/>
-          </p:cNvSpPr>
-          <p:nvPr>
-            <p:ph type="title"/>
-          </p:nvPr>
-        </p:nvSpPr>
-        <p:spPr/>
-        <p:txBody>
-          <a:bodyPr/>
-          <a:lstStyle/>
-          <a:p>
-            <a:endParaRPr lang="en-US" dirty="0"/>
-          </a:p>
-        </p:txBody>
-      </p:sp>
-      <p:pic>
-        <p:nvPicPr>
-          <p:cNvPr id="5" name="Picture 4"/>
-          <p:cNvPicPr>
-            <a:picLocks noChangeAspect="1"/>
-          </p:cNvPicPr>
-          <p:nvPr/>
-        </p:nvPicPr>
-        <p:blipFill>
-          <a:blip r:embed="rId2">
-            <a:extLst>
-              <a:ext uri="{28A0092B-C50C-407E-A947-70E740481C1C}">
-                <a14:useLocalDpi xmlns:a14="http://schemas.microsoft.com/office/drawing/2010/main" val="0"/>
-              </a:ext>
-            </a:extLst>
-          </a:blip>
-          <a:stretch>
-            <a:fillRect/>
-          </a:stretch>
-        </p:blipFill>
-        <p:spPr>
-          <a:xfrm>
-            <a:off x="131950" y="570479"/>
-            <a:ext cx="4336228" cy="3252171"/>
-          </a:xfrm>
-          <a:prstGeom prst="rect">
-            <a:avLst/>
-          </a:prstGeom>
-        </p:spPr>
-      </p:pic>
-      <p:pic>
-        <p:nvPicPr>
-          <p:cNvPr id="6" name="Picture 5"/>
-          <p:cNvPicPr>
-            <a:picLocks noChangeAspect="1"/>
-          </p:cNvPicPr>
-          <p:nvPr/>
-        </p:nvPicPr>
-        <p:blipFill>
-          <a:blip r:embed="rId3">
-            <a:extLst>
-              <a:ext uri="{28A0092B-C50C-407E-A947-70E740481C1C}">
-                <a14:useLocalDpi xmlns:a14="http://schemas.microsoft.com/office/drawing/2010/main" val="0"/>
-              </a:ext>
-            </a:extLst>
-          </a:blip>
-          <a:stretch>
-            <a:fillRect/>
-          </a:stretch>
-        </p:blipFill>
-        <p:spPr>
-          <a:xfrm>
-            <a:off x="4468178" y="570479"/>
-            <a:ext cx="4336228" cy="3252171"/>
-          </a:xfrm>
-          <a:prstGeom prst="rect">
-            <a:avLst/>
-          </a:prstGeom>
-        </p:spPr>
-      </p:pic>
-      <p:pic>
-        <p:nvPicPr>
-          <p:cNvPr id="7" name="Picture 6"/>
-          <p:cNvPicPr>
-            <a:picLocks noChangeAspect="1"/>
-          </p:cNvPicPr>
-          <p:nvPr/>
-        </p:nvPicPr>
-        <p:blipFill>
-          <a:blip r:embed="rId4">
-            <a:extLst>
-              <a:ext uri="{28A0092B-C50C-407E-A947-70E740481C1C}">
-                <a14:useLocalDpi xmlns:a14="http://schemas.microsoft.com/office/drawing/2010/main" val="0"/>
-              </a:ext>
-            </a:extLst>
-          </a:blip>
-          <a:stretch>
-            <a:fillRect/>
-          </a:stretch>
-        </p:blipFill>
-        <p:spPr>
-          <a:xfrm>
-            <a:off x="131950" y="3695155"/>
-            <a:ext cx="4336228" cy="3252171"/>
-          </a:xfrm>
-          <a:prstGeom prst="rect">
-            <a:avLst/>
-          </a:prstGeom>
-        </p:spPr>
-      </p:pic>
-      <p:pic>
-        <p:nvPicPr>
-          <p:cNvPr id="8" name="Picture 7"/>
-          <p:cNvPicPr>
-            <a:picLocks noChangeAspect="1"/>
-          </p:cNvPicPr>
-          <p:nvPr/>
-        </p:nvPicPr>
-        <p:blipFill>
-          <a:blip r:embed="rId5">
-            <a:extLst>
-              <a:ext uri="{28A0092B-C50C-407E-A947-70E740481C1C}">
-                <a14:useLocalDpi xmlns:a14="http://schemas.microsoft.com/office/drawing/2010/main" val="0"/>
-              </a:ext>
-            </a:extLst>
-          </a:blip>
-          <a:stretch>
-            <a:fillRect/>
-          </a:stretch>
-        </p:blipFill>
-        <p:spPr>
-          <a:xfrm>
-            <a:off x="4511408" y="3727579"/>
-            <a:ext cx="4292997" cy="3219748"/>
-          </a:xfrm>
-          <a:prstGeom prst="rect">
-            <a:avLst/>
-          </a:prstGeom>
-        </p:spPr>
-      </p:pic>
-    </p:spTree>
-    <p:extLst>
-      <p:ext uri="{BB962C8B-B14F-4D97-AF65-F5344CB8AC3E}">
-        <p14:creationId xmlns:p14="http://schemas.microsoft.com/office/powerpoint/2010/main" val="1723145221"/>
-      </p:ext>
-    </p:extLst>
-  </p:cSld>
-  <p:clrMapOvr>
-    <a:masterClrMapping/>
-  </p:clrMapOvr>
-  <p:timing>
-    <p:tnLst>
-      <p:par>
-        <p:cTn xmlns:p14="http://schemas.microsoft.com/office/powerpoint/2010/main" id="1" dur="indefinite" restart="never" nodeType="tmRoot"/>
-      </p:par>
-    </p:tnLst>
-  </p:timing>
-</p:sld>
-</file>
-
-<file path=ppt/slides/slide17.xml><?xml version="1.0" encoding="utf-8"?>
-<p:sld xmlns:a="http://schemas.openxmlformats.org/drawingml/2006/main" xmlns:r="http://schemas.openxmlformats.org/officeDocument/2006/relationships" xmlns:p="http://schemas.openxmlformats.org/presentationml/2006/main">
-  <p:cSld>
-    <p:spTree>
-      <p:nvGrpSpPr>
-        <p:cNvPr id="1" name=""/>
-        <p:cNvGrpSpPr/>
-        <p:nvPr/>
-      </p:nvGrpSpPr>
-      <p:grpSpPr>
-        <a:xfrm>
-          <a:off x="0" y="0"/>
-          <a:ext cx="0" cy="0"/>
-          <a:chOff x="0" y="0"/>
-          <a:chExt cx="0" cy="0"/>
-        </a:xfrm>
-      </p:grpSpPr>
-      <p:sp>
-        <p:nvSpPr>
-          <p:cNvPr id="2" name="Title 1"/>
-          <p:cNvSpPr>
-            <a:spLocks noGrp="1"/>
-          </p:cNvSpPr>
-          <p:nvPr>
-            <p:ph type="title"/>
-          </p:nvPr>
-        </p:nvSpPr>
-        <p:spPr/>
-        <p:txBody>
-          <a:bodyPr/>
-          <a:lstStyle/>
-          <a:p>
-            <a:endParaRPr lang="en-US" dirty="0"/>
-          </a:p>
-        </p:txBody>
-      </p:sp>
-      <p:pic>
-        <p:nvPicPr>
-          <p:cNvPr id="5" name="Picture 4"/>
-          <p:cNvPicPr>
-            <a:picLocks noChangeAspect="1"/>
-          </p:cNvPicPr>
-          <p:nvPr/>
-        </p:nvPicPr>
-        <p:blipFill>
-          <a:blip r:embed="rId2">
-            <a:extLst>
-              <a:ext uri="{28A0092B-C50C-407E-A947-70E740481C1C}">
-                <a14:useLocalDpi xmlns:a14="http://schemas.microsoft.com/office/drawing/2010/main" val="0"/>
-              </a:ext>
-            </a:extLst>
-          </a:blip>
-          <a:stretch>
-            <a:fillRect/>
-          </a:stretch>
-        </p:blipFill>
-        <p:spPr>
-          <a:xfrm>
-            <a:off x="131950" y="570479"/>
-            <a:ext cx="4336228" cy="3252171"/>
-          </a:xfrm>
-          <a:prstGeom prst="rect">
-            <a:avLst/>
-          </a:prstGeom>
-        </p:spPr>
-      </p:pic>
-      <p:pic>
-        <p:nvPicPr>
-          <p:cNvPr id="6" name="Picture 5"/>
-          <p:cNvPicPr>
-            <a:picLocks noChangeAspect="1"/>
-          </p:cNvPicPr>
-          <p:nvPr/>
-        </p:nvPicPr>
-        <p:blipFill>
-          <a:blip r:embed="rId3">
-            <a:extLst>
-              <a:ext uri="{28A0092B-C50C-407E-A947-70E740481C1C}">
-                <a14:useLocalDpi xmlns:a14="http://schemas.microsoft.com/office/drawing/2010/main" val="0"/>
-              </a:ext>
-            </a:extLst>
-          </a:blip>
-          <a:stretch>
-            <a:fillRect/>
-          </a:stretch>
-        </p:blipFill>
-        <p:spPr>
-          <a:xfrm>
-            <a:off x="4468178" y="570479"/>
-            <a:ext cx="4336228" cy="3252171"/>
-          </a:xfrm>
-          <a:prstGeom prst="rect">
-            <a:avLst/>
-          </a:prstGeom>
-        </p:spPr>
-      </p:pic>
-      <p:pic>
-        <p:nvPicPr>
-          <p:cNvPr id="7" name="Picture 6"/>
-          <p:cNvPicPr>
-            <a:picLocks noChangeAspect="1"/>
-          </p:cNvPicPr>
-          <p:nvPr/>
-        </p:nvPicPr>
-        <p:blipFill>
-          <a:blip r:embed="rId4">
-            <a:extLst>
-              <a:ext uri="{28A0092B-C50C-407E-A947-70E740481C1C}">
-                <a14:useLocalDpi xmlns:a14="http://schemas.microsoft.com/office/drawing/2010/main" val="0"/>
-              </a:ext>
-            </a:extLst>
-          </a:blip>
-          <a:stretch>
-            <a:fillRect/>
-          </a:stretch>
-        </p:blipFill>
-        <p:spPr>
-          <a:xfrm>
-            <a:off x="131950" y="3695155"/>
-            <a:ext cx="4336228" cy="3252171"/>
-          </a:xfrm>
-          <a:prstGeom prst="rect">
-            <a:avLst/>
-          </a:prstGeom>
-        </p:spPr>
-      </p:pic>
-      <p:pic>
-        <p:nvPicPr>
-          <p:cNvPr id="8" name="Picture 7"/>
-          <p:cNvPicPr>
-            <a:picLocks noChangeAspect="1"/>
-          </p:cNvPicPr>
-          <p:nvPr/>
-        </p:nvPicPr>
-        <p:blipFill>
-          <a:blip r:embed="rId5">
-            <a:extLst>
-              <a:ext uri="{28A0092B-C50C-407E-A947-70E740481C1C}">
-                <a14:useLocalDpi xmlns:a14="http://schemas.microsoft.com/office/drawing/2010/main" val="0"/>
-              </a:ext>
-            </a:extLst>
-          </a:blip>
-          <a:stretch>
-            <a:fillRect/>
-          </a:stretch>
-        </p:blipFill>
-        <p:spPr>
-          <a:xfrm>
-            <a:off x="4511408" y="3727579"/>
-            <a:ext cx="4292997" cy="3219748"/>
-          </a:xfrm>
-          <a:prstGeom prst="rect">
-            <a:avLst/>
-          </a:prstGeom>
-        </p:spPr>
-      </p:pic>
-    </p:spTree>
-    <p:extLst>
-      <p:ext uri="{BB962C8B-B14F-4D97-AF65-F5344CB8AC3E}">
-        <p14:creationId xmlns:p14="http://schemas.microsoft.com/office/powerpoint/2010/main" val="2246945470"/>
-      </p:ext>
-    </p:extLst>
-  </p:cSld>
-  <p:clrMapOvr>
-    <a:masterClrMapping/>
-  </p:clrMapOvr>
-  <p:timing>
-    <p:tnLst>
-      <p:par>
-        <p:cTn xmlns:p14="http://schemas.microsoft.com/office/powerpoint/2010/main" id="1" dur="indefinite" restart="never" nodeType="tmRoot"/>
-      </p:par>
-    </p:tnLst>
-  </p:timing>
-</p:sld>
-</file>
-
-<file path=ppt/slides/slide18.xml><?xml version="1.0" encoding="utf-8"?>
-<p:sld xmlns:a="http://schemas.openxmlformats.org/drawingml/2006/main" xmlns:r="http://schemas.openxmlformats.org/officeDocument/2006/relationships" xmlns:p="http://schemas.openxmlformats.org/presentationml/2006/main">
-  <p:cSld>
-    <p:spTree>
-      <p:nvGrpSpPr>
-        <p:cNvPr id="1" name=""/>
-        <p:cNvGrpSpPr/>
-        <p:nvPr/>
-      </p:nvGrpSpPr>
-      <p:grpSpPr>
-        <a:xfrm>
-          <a:off x="0" y="0"/>
-          <a:ext cx="0" cy="0"/>
-          <a:chOff x="0" y="0"/>
-          <a:chExt cx="0" cy="0"/>
-        </a:xfrm>
-      </p:grpSpPr>
-      <p:sp>
-        <p:nvSpPr>
-          <p:cNvPr id="2" name="Title 1"/>
-          <p:cNvSpPr>
-            <a:spLocks noGrp="1"/>
-          </p:cNvSpPr>
-          <p:nvPr>
-            <p:ph type="title"/>
-          </p:nvPr>
-        </p:nvSpPr>
-        <p:spPr/>
-        <p:txBody>
-          <a:bodyPr/>
-          <a:lstStyle/>
-          <a:p>
-            <a:endParaRPr lang="en-US" dirty="0"/>
-          </a:p>
-        </p:txBody>
-      </p:sp>
-      <p:pic>
-        <p:nvPicPr>
-          <p:cNvPr id="5" name="Picture 4"/>
-          <p:cNvPicPr>
-            <a:picLocks noChangeAspect="1"/>
-          </p:cNvPicPr>
-          <p:nvPr/>
-        </p:nvPicPr>
-        <p:blipFill>
-          <a:blip r:embed="rId2">
-            <a:extLst>
-              <a:ext uri="{28A0092B-C50C-407E-A947-70E740481C1C}">
-                <a14:useLocalDpi xmlns:a14="http://schemas.microsoft.com/office/drawing/2010/main" val="0"/>
-              </a:ext>
-            </a:extLst>
-          </a:blip>
-          <a:stretch>
-            <a:fillRect/>
-          </a:stretch>
-        </p:blipFill>
-        <p:spPr>
-          <a:xfrm>
-            <a:off x="131950" y="570479"/>
-            <a:ext cx="4336228" cy="3252171"/>
-          </a:xfrm>
-          <a:prstGeom prst="rect">
-            <a:avLst/>
-          </a:prstGeom>
-        </p:spPr>
-      </p:pic>
-      <p:pic>
-        <p:nvPicPr>
-          <p:cNvPr id="6" name="Picture 5"/>
-          <p:cNvPicPr>
-            <a:picLocks noChangeAspect="1"/>
-          </p:cNvPicPr>
-          <p:nvPr/>
-        </p:nvPicPr>
-        <p:blipFill>
-          <a:blip r:embed="rId3">
-            <a:extLst>
-              <a:ext uri="{28A0092B-C50C-407E-A947-70E740481C1C}">
-                <a14:useLocalDpi xmlns:a14="http://schemas.microsoft.com/office/drawing/2010/main" val="0"/>
-              </a:ext>
-            </a:extLst>
-          </a:blip>
-          <a:stretch>
-            <a:fillRect/>
-          </a:stretch>
-        </p:blipFill>
-        <p:spPr>
-          <a:xfrm>
-            <a:off x="4468178" y="570479"/>
-            <a:ext cx="4336228" cy="3252171"/>
-          </a:xfrm>
-          <a:prstGeom prst="rect">
-            <a:avLst/>
-          </a:prstGeom>
-        </p:spPr>
-      </p:pic>
-      <p:pic>
-        <p:nvPicPr>
-          <p:cNvPr id="7" name="Picture 6"/>
-          <p:cNvPicPr>
-            <a:picLocks noChangeAspect="1"/>
-          </p:cNvPicPr>
-          <p:nvPr/>
-        </p:nvPicPr>
-        <p:blipFill>
-          <a:blip r:embed="rId4">
-            <a:extLst>
-              <a:ext uri="{28A0092B-C50C-407E-A947-70E740481C1C}">
-                <a14:useLocalDpi xmlns:a14="http://schemas.microsoft.com/office/drawing/2010/main" val="0"/>
-              </a:ext>
-            </a:extLst>
-          </a:blip>
-          <a:stretch>
-            <a:fillRect/>
-          </a:stretch>
-        </p:blipFill>
-        <p:spPr>
-          <a:xfrm>
-            <a:off x="131950" y="3695155"/>
-            <a:ext cx="4336228" cy="3252171"/>
-          </a:xfrm>
-          <a:prstGeom prst="rect">
-            <a:avLst/>
-          </a:prstGeom>
-        </p:spPr>
-      </p:pic>
-      <p:pic>
-        <p:nvPicPr>
-          <p:cNvPr id="8" name="Picture 7"/>
-          <p:cNvPicPr>
-            <a:picLocks noChangeAspect="1"/>
-          </p:cNvPicPr>
-          <p:nvPr/>
-        </p:nvPicPr>
-        <p:blipFill>
-          <a:blip r:embed="rId5">
-            <a:extLst>
-              <a:ext uri="{28A0092B-C50C-407E-A947-70E740481C1C}">
-                <a14:useLocalDpi xmlns:a14="http://schemas.microsoft.com/office/drawing/2010/main" val="0"/>
-              </a:ext>
-            </a:extLst>
-          </a:blip>
-          <a:stretch>
-            <a:fillRect/>
-          </a:stretch>
-        </p:blipFill>
-        <p:spPr>
-          <a:xfrm>
-            <a:off x="4511408" y="3727579"/>
-            <a:ext cx="4292997" cy="3219748"/>
-          </a:xfrm>
-          <a:prstGeom prst="rect">
-            <a:avLst/>
-          </a:prstGeom>
-        </p:spPr>
-      </p:pic>
-    </p:spTree>
-    <p:extLst>
-      <p:ext uri="{BB962C8B-B14F-4D97-AF65-F5344CB8AC3E}">
-        <p14:creationId xmlns:p14="http://schemas.microsoft.com/office/powerpoint/2010/main" val="1163332363"/>
-      </p:ext>
-    </p:extLst>
-  </p:cSld>
-  <p:clrMapOvr>
-    <a:masterClrMapping/>
-  </p:clrMapOvr>
-</p:sld>
-</file>
-
-<file path=ppt/slides/slide19.xml><?xml version="1.0" encoding="utf-8"?>
-<p:sld xmlns:a="http://schemas.openxmlformats.org/drawingml/2006/main" xmlns:r="http://schemas.openxmlformats.org/officeDocument/2006/relationships" xmlns:p="http://schemas.openxmlformats.org/presentationml/2006/main">
-  <p:cSld>
-    <p:spTree>
-      <p:nvGrpSpPr>
-        <p:cNvPr id="1" name=""/>
-        <p:cNvGrpSpPr/>
-        <p:nvPr/>
-      </p:nvGrpSpPr>
-      <p:grpSpPr>
-        <a:xfrm>
-          <a:off x="0" y="0"/>
-          <a:ext cx="0" cy="0"/>
-          <a:chOff x="0" y="0"/>
-          <a:chExt cx="0" cy="0"/>
-        </a:xfrm>
-      </p:grpSpPr>
-      <p:sp>
-        <p:nvSpPr>
-          <p:cNvPr id="2" name="Title 1"/>
-          <p:cNvSpPr>
-            <a:spLocks noGrp="1"/>
-          </p:cNvSpPr>
-          <p:nvPr>
-            <p:ph type="title"/>
-          </p:nvPr>
-        </p:nvSpPr>
-        <p:spPr/>
-        <p:txBody>
-          <a:bodyPr/>
-          <a:lstStyle/>
-          <a:p>
-            <a:endParaRPr lang="en-US" dirty="0"/>
-          </a:p>
-        </p:txBody>
-      </p:sp>
-      <p:pic>
-        <p:nvPicPr>
-          <p:cNvPr id="5" name="Picture 4" descr="covar0.png"/>
-          <p:cNvPicPr>
-            <a:picLocks noChangeAspect="1"/>
-          </p:cNvPicPr>
-          <p:nvPr/>
-        </p:nvPicPr>
-        <p:blipFill>
-          <a:blip r:embed="rId2">
-            <a:extLst>
-              <a:ext uri="{28A0092B-C50C-407E-A947-70E740481C1C}">
-                <a14:useLocalDpi xmlns:a14="http://schemas.microsoft.com/office/drawing/2010/main" val="0"/>
-              </a:ext>
-            </a:extLst>
-          </a:blip>
-          <a:stretch>
-            <a:fillRect/>
-          </a:stretch>
-        </p:blipFill>
-        <p:spPr>
-          <a:xfrm>
-            <a:off x="131950" y="570479"/>
-            <a:ext cx="4336228" cy="3252171"/>
-          </a:xfrm>
-          <a:prstGeom prst="rect">
-            <a:avLst/>
-          </a:prstGeom>
-        </p:spPr>
-      </p:pic>
-      <p:pic>
-        <p:nvPicPr>
-          <p:cNvPr id="6" name="Picture 5" descr="covar1.png"/>
-          <p:cNvPicPr>
-            <a:picLocks noChangeAspect="1"/>
-          </p:cNvPicPr>
-          <p:nvPr/>
-        </p:nvPicPr>
-        <p:blipFill>
-          <a:blip r:embed="rId3">
-            <a:extLst>
-              <a:ext uri="{28A0092B-C50C-407E-A947-70E740481C1C}">
-                <a14:useLocalDpi xmlns:a14="http://schemas.microsoft.com/office/drawing/2010/main" val="0"/>
-              </a:ext>
-            </a:extLst>
-          </a:blip>
-          <a:stretch>
-            <a:fillRect/>
-          </a:stretch>
-        </p:blipFill>
-        <p:spPr>
-          <a:xfrm>
-            <a:off x="4468178" y="570479"/>
-            <a:ext cx="4336228" cy="3252171"/>
-          </a:xfrm>
-          <a:prstGeom prst="rect">
-            <a:avLst/>
-          </a:prstGeom>
-        </p:spPr>
-      </p:pic>
-      <p:pic>
-        <p:nvPicPr>
-          <p:cNvPr id="7" name="Picture 6" descr="covar2.png"/>
-          <p:cNvPicPr>
-            <a:picLocks noChangeAspect="1"/>
-          </p:cNvPicPr>
-          <p:nvPr/>
-        </p:nvPicPr>
-        <p:blipFill>
-          <a:blip r:embed="rId4">
-            <a:extLst>
-              <a:ext uri="{28A0092B-C50C-407E-A947-70E740481C1C}">
-                <a14:useLocalDpi xmlns:a14="http://schemas.microsoft.com/office/drawing/2010/main" val="0"/>
-              </a:ext>
-            </a:extLst>
-          </a:blip>
-          <a:stretch>
-            <a:fillRect/>
-          </a:stretch>
-        </p:blipFill>
-        <p:spPr>
-          <a:xfrm>
-            <a:off x="131950" y="3695155"/>
-            <a:ext cx="4336228" cy="3252172"/>
-          </a:xfrm>
-          <a:prstGeom prst="rect">
-            <a:avLst/>
-          </a:prstGeom>
-        </p:spPr>
-      </p:pic>
-      <p:pic>
-        <p:nvPicPr>
-          <p:cNvPr id="8" name="Picture 7" descr="covar5.png"/>
-          <p:cNvPicPr>
-            <a:picLocks noChangeAspect="1"/>
-          </p:cNvPicPr>
-          <p:nvPr/>
-        </p:nvPicPr>
-        <p:blipFill>
-          <a:blip r:embed="rId5">
-            <a:extLst>
-              <a:ext uri="{28A0092B-C50C-407E-A947-70E740481C1C}">
-                <a14:useLocalDpi xmlns:a14="http://schemas.microsoft.com/office/drawing/2010/main" val="0"/>
-              </a:ext>
-            </a:extLst>
-          </a:blip>
-          <a:stretch>
-            <a:fillRect/>
-          </a:stretch>
-        </p:blipFill>
-        <p:spPr>
-          <a:xfrm>
-            <a:off x="4511408" y="3727579"/>
-            <a:ext cx="4292998" cy="3219748"/>
-          </a:xfrm>
-          <a:prstGeom prst="rect">
-            <a:avLst/>
-          </a:prstGeom>
-        </p:spPr>
-      </p:pic>
-    </p:spTree>
-    <p:extLst>
-      <p:ext uri="{BB962C8B-B14F-4D97-AF65-F5344CB8AC3E}">
-        <p14:creationId xmlns:p14="http://schemas.microsoft.com/office/powerpoint/2010/main" val="1097571273"/>
-      </p:ext>
-    </p:extLst>
-  </p:cSld>
-  <p:clrMapOvr>
-    <a:masterClrMapping/>
-  </p:clrMapOvr>
-</p:sld>
-</file>
-
 <file path=ppt/slides/slide2.xml><?xml version="1.0" encoding="utf-8"?>
 <p:sld xmlns:a="http://schemas.openxmlformats.org/drawingml/2006/main" xmlns:r="http://schemas.openxmlformats.org/officeDocument/2006/relationships" xmlns:p="http://schemas.openxmlformats.org/presentationml/2006/main">
   <p:cSld>
@@ -4964,11 +4262,7 @@
             </a:r>
             <a:r>
               <a:rPr lang="en-US" sz="2000" dirty="0" smtClean="0"/>
-              <a:t>is </a:t>
-            </a:r>
-            <a:r>
-              <a:rPr lang="en-US" sz="2000" dirty="0" smtClean="0"/>
-              <a:t>∝ </a:t>
+              <a:t>is ∝ </a:t>
             </a:r>
             <a:r>
               <a:rPr lang="el-GR" sz="2000" b="1" dirty="0" smtClean="0"/>
@@ -4982,11 +4276,7 @@
           <a:p>
             <a:r>
               <a:rPr lang="en-US" sz="2000" dirty="0" smtClean="0"/>
-              <a:t>Frequency dependence:</a:t>
-            </a:r>
-            <a:r>
-              <a:rPr lang="en-US" sz="2000" dirty="0" smtClean="0"/>
-              <a:t> </a:t>
+              <a:t>Frequency dependence: </a:t>
             </a:r>
             <a:r>
               <a:rPr lang="el-GR" sz="2000" b="1" dirty="0" smtClean="0"/>
@@ -4994,11 +4284,7 @@
             </a:r>
             <a:r>
               <a:rPr lang="en-US" sz="2000" dirty="0" smtClean="0"/>
-              <a:t> </a:t>
-            </a:r>
-            <a:r>
-              <a:rPr lang="en-US" sz="2000" dirty="0" smtClean="0"/>
-              <a:t>∝</a:t>
+              <a:t> ∝</a:t>
             </a:r>
             <a:r>
               <a:rPr lang="el-GR" sz="2000" b="1" dirty="0" smtClean="0"/>
@@ -5012,11 +4298,7 @@
           <a:p>
             <a:r>
               <a:rPr lang="en-US" sz="2000" dirty="0" smtClean="0"/>
-              <a:t> </a:t>
-            </a:r>
-            <a:r>
-              <a:rPr lang="en-US" sz="2000" dirty="0" smtClean="0"/>
-              <a:t>∆</a:t>
+              <a:t> ∆</a:t>
             </a:r>
             <a:r>
               <a:rPr lang="en-US" sz="2000" dirty="0" err="1" smtClean="0"/>
@@ -5028,11 +4310,7 @@
             </a:r>
             <a:r>
               <a:rPr lang="en-US" sz="2000" dirty="0" smtClean="0"/>
-              <a:t> </a:t>
-            </a:r>
-            <a:r>
-              <a:rPr lang="en-US" sz="2000" dirty="0" smtClean="0"/>
-              <a:t>∝</a:t>
+              <a:t> ∝</a:t>
             </a:r>
             <a:r>
               <a:rPr lang="en-US" sz="2000" b="1" dirty="0"/>
@@ -5154,344 +4432,6 @@
 </p:sld>
 </file>
 
-<file path=ppt/slides/slide20.xml><?xml version="1.0" encoding="utf-8"?>
-<p:sld xmlns:a="http://schemas.openxmlformats.org/drawingml/2006/main" xmlns:r="http://schemas.openxmlformats.org/officeDocument/2006/relationships" xmlns:p="http://schemas.openxmlformats.org/presentationml/2006/main">
-  <p:cSld>
-    <p:spTree>
-      <p:nvGrpSpPr>
-        <p:cNvPr id="1" name=""/>
-        <p:cNvGrpSpPr/>
-        <p:nvPr/>
-      </p:nvGrpSpPr>
-      <p:grpSpPr>
-        <a:xfrm>
-          <a:off x="0" y="0"/>
-          <a:ext cx="0" cy="0"/>
-          <a:chOff x="0" y="0"/>
-          <a:chExt cx="0" cy="0"/>
-        </a:xfrm>
-      </p:grpSpPr>
-      <p:sp>
-        <p:nvSpPr>
-          <p:cNvPr id="2" name="Title 1"/>
-          <p:cNvSpPr>
-            <a:spLocks noGrp="1"/>
-          </p:cNvSpPr>
-          <p:nvPr>
-            <p:ph type="title"/>
-          </p:nvPr>
-        </p:nvSpPr>
-        <p:spPr/>
-        <p:txBody>
-          <a:bodyPr/>
-          <a:lstStyle/>
-          <a:p>
-            <a:endParaRPr lang="en-US" dirty="0"/>
-          </a:p>
-        </p:txBody>
-      </p:sp>
-      <p:pic>
-        <p:nvPicPr>
-          <p:cNvPr id="5" name="Picture 4"/>
-          <p:cNvPicPr>
-            <a:picLocks noChangeAspect="1"/>
-          </p:cNvPicPr>
-          <p:nvPr/>
-        </p:nvPicPr>
-        <p:blipFill>
-          <a:blip r:embed="rId2">
-            <a:extLst>
-              <a:ext uri="{28A0092B-C50C-407E-A947-70E740481C1C}">
-                <a14:useLocalDpi xmlns:a14="http://schemas.microsoft.com/office/drawing/2010/main" val="0"/>
-              </a:ext>
-            </a:extLst>
-          </a:blip>
-          <a:stretch>
-            <a:fillRect/>
-          </a:stretch>
-        </p:blipFill>
-        <p:spPr>
-          <a:xfrm>
-            <a:off x="131950" y="570479"/>
-            <a:ext cx="4336228" cy="3252171"/>
-          </a:xfrm>
-          <a:prstGeom prst="rect">
-            <a:avLst/>
-          </a:prstGeom>
-        </p:spPr>
-      </p:pic>
-      <p:pic>
-        <p:nvPicPr>
-          <p:cNvPr id="6" name="Picture 5"/>
-          <p:cNvPicPr>
-            <a:picLocks noChangeAspect="1"/>
-          </p:cNvPicPr>
-          <p:nvPr/>
-        </p:nvPicPr>
-        <p:blipFill>
-          <a:blip r:embed="rId3">
-            <a:extLst>
-              <a:ext uri="{28A0092B-C50C-407E-A947-70E740481C1C}">
-                <a14:useLocalDpi xmlns:a14="http://schemas.microsoft.com/office/drawing/2010/main" val="0"/>
-              </a:ext>
-            </a:extLst>
-          </a:blip>
-          <a:stretch>
-            <a:fillRect/>
-          </a:stretch>
-        </p:blipFill>
-        <p:spPr>
-          <a:xfrm>
-            <a:off x="4468178" y="570479"/>
-            <a:ext cx="4336228" cy="3252171"/>
-          </a:xfrm>
-          <a:prstGeom prst="rect">
-            <a:avLst/>
-          </a:prstGeom>
-        </p:spPr>
-      </p:pic>
-      <p:pic>
-        <p:nvPicPr>
-          <p:cNvPr id="7" name="Picture 6"/>
-          <p:cNvPicPr>
-            <a:picLocks noChangeAspect="1"/>
-          </p:cNvPicPr>
-          <p:nvPr/>
-        </p:nvPicPr>
-        <p:blipFill>
-          <a:blip r:embed="rId4">
-            <a:extLst>
-              <a:ext uri="{28A0092B-C50C-407E-A947-70E740481C1C}">
-                <a14:useLocalDpi xmlns:a14="http://schemas.microsoft.com/office/drawing/2010/main" val="0"/>
-              </a:ext>
-            </a:extLst>
-          </a:blip>
-          <a:stretch>
-            <a:fillRect/>
-          </a:stretch>
-        </p:blipFill>
-        <p:spPr>
-          <a:xfrm>
-            <a:off x="131950" y="3695155"/>
-            <a:ext cx="4336228" cy="3252171"/>
-          </a:xfrm>
-          <a:prstGeom prst="rect">
-            <a:avLst/>
-          </a:prstGeom>
-        </p:spPr>
-      </p:pic>
-      <p:pic>
-        <p:nvPicPr>
-          <p:cNvPr id="8" name="Picture 7"/>
-          <p:cNvPicPr>
-            <a:picLocks noChangeAspect="1"/>
-          </p:cNvPicPr>
-          <p:nvPr/>
-        </p:nvPicPr>
-        <p:blipFill>
-          <a:blip r:embed="rId5">
-            <a:extLst>
-              <a:ext uri="{28A0092B-C50C-407E-A947-70E740481C1C}">
-                <a14:useLocalDpi xmlns:a14="http://schemas.microsoft.com/office/drawing/2010/main" val="0"/>
-              </a:ext>
-            </a:extLst>
-          </a:blip>
-          <a:stretch>
-            <a:fillRect/>
-          </a:stretch>
-        </p:blipFill>
-        <p:spPr>
-          <a:xfrm>
-            <a:off x="4511408" y="3727579"/>
-            <a:ext cx="4292997" cy="3219748"/>
-          </a:xfrm>
-          <a:prstGeom prst="rect">
-            <a:avLst/>
-          </a:prstGeom>
-        </p:spPr>
-      </p:pic>
-    </p:spTree>
-    <p:extLst>
-      <p:ext uri="{BB962C8B-B14F-4D97-AF65-F5344CB8AC3E}">
-        <p14:creationId xmlns:p14="http://schemas.microsoft.com/office/powerpoint/2010/main" val="884919024"/>
-      </p:ext>
-    </p:extLst>
-  </p:cSld>
-  <p:clrMapOvr>
-    <a:masterClrMapping/>
-  </p:clrMapOvr>
-</p:sld>
-</file>
-
-<file path=ppt/slides/slide21.xml><?xml version="1.0" encoding="utf-8"?>
-<p:sld xmlns:a="http://schemas.openxmlformats.org/drawingml/2006/main" xmlns:r="http://schemas.openxmlformats.org/officeDocument/2006/relationships" xmlns:p="http://schemas.openxmlformats.org/presentationml/2006/main">
-  <p:cSld>
-    <p:spTree>
-      <p:nvGrpSpPr>
-        <p:cNvPr id="1" name=""/>
-        <p:cNvGrpSpPr/>
-        <p:nvPr/>
-      </p:nvGrpSpPr>
-      <p:grpSpPr>
-        <a:xfrm>
-          <a:off x="0" y="0"/>
-          <a:ext cx="0" cy="0"/>
-          <a:chOff x="0" y="0"/>
-          <a:chExt cx="0" cy="0"/>
-        </a:xfrm>
-      </p:grpSpPr>
-      <p:sp>
-        <p:nvSpPr>
-          <p:cNvPr id="2" name="Title 1"/>
-          <p:cNvSpPr>
-            <a:spLocks noGrp="1"/>
-          </p:cNvSpPr>
-          <p:nvPr>
-            <p:ph type="title"/>
-          </p:nvPr>
-        </p:nvSpPr>
-        <p:spPr/>
-        <p:txBody>
-          <a:bodyPr/>
-          <a:lstStyle/>
-          <a:p>
-            <a:endParaRPr lang="en-US" dirty="0"/>
-          </a:p>
-        </p:txBody>
-      </p:sp>
-      <p:pic>
-        <p:nvPicPr>
-          <p:cNvPr id="5" name="Picture 4"/>
-          <p:cNvPicPr>
-            <a:picLocks noChangeAspect="1"/>
-          </p:cNvPicPr>
-          <p:nvPr/>
-        </p:nvPicPr>
-        <p:blipFill>
-          <a:blip r:embed="rId2">
-            <a:extLst>
-              <a:ext uri="{28A0092B-C50C-407E-A947-70E740481C1C}">
-                <a14:useLocalDpi xmlns:a14="http://schemas.microsoft.com/office/drawing/2010/main" val="0"/>
-              </a:ext>
-            </a:extLst>
-          </a:blip>
-          <a:stretch>
-            <a:fillRect/>
-          </a:stretch>
-        </p:blipFill>
-        <p:spPr>
-          <a:xfrm>
-            <a:off x="131950" y="570479"/>
-            <a:ext cx="4336228" cy="3252171"/>
-          </a:xfrm>
-          <a:prstGeom prst="rect">
-            <a:avLst/>
-          </a:prstGeom>
-        </p:spPr>
-      </p:pic>
-      <p:pic>
-        <p:nvPicPr>
-          <p:cNvPr id="6" name="Picture 5"/>
-          <p:cNvPicPr>
-            <a:picLocks noChangeAspect="1"/>
-          </p:cNvPicPr>
-          <p:nvPr/>
-        </p:nvPicPr>
-        <p:blipFill>
-          <a:blip r:embed="rId3">
-            <a:extLst>
-              <a:ext uri="{28A0092B-C50C-407E-A947-70E740481C1C}">
-                <a14:useLocalDpi xmlns:a14="http://schemas.microsoft.com/office/drawing/2010/main" val="0"/>
-              </a:ext>
-            </a:extLst>
-          </a:blip>
-          <a:stretch>
-            <a:fillRect/>
-          </a:stretch>
-        </p:blipFill>
-        <p:spPr>
-          <a:xfrm>
-            <a:off x="4468178" y="570479"/>
-            <a:ext cx="4336228" cy="3252171"/>
-          </a:xfrm>
-          <a:prstGeom prst="rect">
-            <a:avLst/>
-          </a:prstGeom>
-        </p:spPr>
-      </p:pic>
-      <p:pic>
-        <p:nvPicPr>
-          <p:cNvPr id="7" name="Picture 6"/>
-          <p:cNvPicPr>
-            <a:picLocks noChangeAspect="1"/>
-          </p:cNvPicPr>
-          <p:nvPr/>
-        </p:nvPicPr>
-        <p:blipFill>
-          <a:blip r:embed="rId4">
-            <a:extLst>
-              <a:ext uri="{28A0092B-C50C-407E-A947-70E740481C1C}">
-                <a14:useLocalDpi xmlns:a14="http://schemas.microsoft.com/office/drawing/2010/main" val="0"/>
-              </a:ext>
-            </a:extLst>
-          </a:blip>
-          <a:stretch>
-            <a:fillRect/>
-          </a:stretch>
-        </p:blipFill>
-        <p:spPr>
-          <a:xfrm>
-            <a:off x="131950" y="3695155"/>
-            <a:ext cx="4336228" cy="3252171"/>
-          </a:xfrm>
-          <a:prstGeom prst="rect">
-            <a:avLst/>
-          </a:prstGeom>
-        </p:spPr>
-      </p:pic>
-      <p:pic>
-        <p:nvPicPr>
-          <p:cNvPr id="8" name="Picture 7"/>
-          <p:cNvPicPr>
-            <a:picLocks noChangeAspect="1"/>
-          </p:cNvPicPr>
-          <p:nvPr/>
-        </p:nvPicPr>
-        <p:blipFill>
-          <a:blip r:embed="rId5">
-            <a:extLst>
-              <a:ext uri="{28A0092B-C50C-407E-A947-70E740481C1C}">
-                <a14:useLocalDpi xmlns:a14="http://schemas.microsoft.com/office/drawing/2010/main" val="0"/>
-              </a:ext>
-            </a:extLst>
-          </a:blip>
-          <a:stretch>
-            <a:fillRect/>
-          </a:stretch>
-        </p:blipFill>
-        <p:spPr>
-          <a:xfrm>
-            <a:off x="4511408" y="3727579"/>
-            <a:ext cx="4292997" cy="3219747"/>
-          </a:xfrm>
-          <a:prstGeom prst="rect">
-            <a:avLst/>
-          </a:prstGeom>
-        </p:spPr>
-      </p:pic>
-    </p:spTree>
-    <p:extLst>
-      <p:ext uri="{BB962C8B-B14F-4D97-AF65-F5344CB8AC3E}">
-        <p14:creationId xmlns:p14="http://schemas.microsoft.com/office/powerpoint/2010/main" val="1588131115"/>
-      </p:ext>
-    </p:extLst>
-  </p:cSld>
-  <p:clrMapOvr>
-    <a:masterClrMapping/>
-  </p:clrMapOvr>
-</p:sld>
-</file>
-
 <file path=ppt/slides/slide3.xml><?xml version="1.0" encoding="utf-8"?>
 <p:sld xmlns:a="http://schemas.openxmlformats.org/drawingml/2006/main" xmlns:r="http://schemas.openxmlformats.org/officeDocument/2006/relationships" xmlns:p="http://schemas.openxmlformats.org/presentationml/2006/main">
   <p:cSld>
@@ -5571,7 +4511,6 @@
               <a:rPr lang="en-US" dirty="0" smtClean="0"/>
               <a:t>)</a:t>
             </a:r>
-            <a:endParaRPr lang="en-US" dirty="0" smtClean="0"/>
           </a:p>
           <a:p>
             <a:r>
@@ -5935,19 +4874,11 @@
           <a:p>
             <a:r>
               <a:rPr lang="en-US" dirty="0" smtClean="0"/>
-              <a:t>∆t </a:t>
-            </a:r>
-            <a:r>
-              <a:rPr lang="en-US" dirty="0" smtClean="0"/>
-              <a:t>(</a:t>
+              <a:t>∆t (</a:t>
             </a:r>
             <a:r>
               <a:rPr lang="en-US" dirty="0" err="1" smtClean="0"/>
-              <a:t>micro</a:t>
-            </a:r>
-            <a:r>
-              <a:rPr lang="en-US" dirty="0" err="1" smtClean="0"/>
-              <a:t>sec</a:t>
+              <a:t>microsec</a:t>
             </a:r>
             <a:r>
               <a:rPr lang="en-US" dirty="0" smtClean="0"/>

</xml_diff>